<commit_message>
BD doc: update driver examples and doc figures
</commit_message>
<xml_diff>
--- a/docs/source/user/beamdyn/figs/manual_plots.pptx
+++ b/docs/source/user/beamdyn/figs/manual_plots.pptx
@@ -109,6 +109,22 @@
       </a:defRPr>
     </a:lvl9pPr>
   </p:defaultTextStyle>
+  <p:extLst>
+    <p:ext uri="{EFAFB233-063F-42B5-8137-9DF3F51BA10A}">
+      <p15:sldGuideLst xmlns:p15="http://schemas.microsoft.com/office/powerpoint/2012/main">
+        <p15:guide id="1" orient="horz" pos="2115">
+          <p15:clr>
+            <a:srgbClr val="A4A3A4"/>
+          </p15:clr>
+        </p15:guide>
+        <p15:guide id="2" pos="2880">
+          <p15:clr>
+            <a:srgbClr val="A4A3A4"/>
+          </p15:clr>
+        </p15:guide>
+      </p15:sldGuideLst>
+    </p:ext>
+  </p:extLst>
 </p:presentation>
 </file>
 
@@ -150,10 +166,9 @@
           <a:lstStyle/>
           <a:p>
             <a:r>
-              <a:rPr lang="en-US" smtClean="0"/>
+              <a:rPr lang="en-US"/>
               <a:t>Click to edit Master title style</a:t>
             </a:r>
-            <a:endParaRPr lang="en-US"/>
           </a:p>
         </p:txBody>
       </p:sp>
@@ -269,10 +284,9 @@
           </a:lstStyle>
           <a:p>
             <a:r>
-              <a:rPr lang="en-US" smtClean="0"/>
+              <a:rPr lang="en-US"/>
               <a:t>Click to edit Master subtitle style</a:t>
             </a:r>
-            <a:endParaRPr lang="en-US"/>
           </a:p>
         </p:txBody>
       </p:sp>
@@ -293,7 +307,7 @@
           <a:p>
             <a:fld id="{95118352-742C-7B43-8F22-628C53C0DDC2}" type="datetimeFigureOut">
               <a:rPr lang="en-US" smtClean="0"/>
-              <a:t>11/14/15</a:t>
+              <a:t>10/24/19</a:t>
             </a:fld>
             <a:endParaRPr lang="en-US"/>
           </a:p>
@@ -387,10 +401,9 @@
           <a:lstStyle/>
           <a:p>
             <a:r>
-              <a:rPr lang="en-US" smtClean="0"/>
+              <a:rPr lang="en-US"/>
               <a:t>Click to edit Master title style</a:t>
             </a:r>
-            <a:endParaRPr lang="en-US"/>
           </a:p>
         </p:txBody>
       </p:sp>
@@ -411,38 +424,37 @@
           <a:p>
             <a:pPr lvl="0"/>
             <a:r>
-              <a:rPr lang="en-US" smtClean="0"/>
+              <a:rPr lang="en-US"/>
               <a:t>Click to edit Master text styles</a:t>
             </a:r>
           </a:p>
           <a:p>
             <a:pPr lvl="1"/>
             <a:r>
-              <a:rPr lang="en-US" smtClean="0"/>
+              <a:rPr lang="en-US"/>
               <a:t>Second level</a:t>
             </a:r>
           </a:p>
           <a:p>
             <a:pPr lvl="2"/>
             <a:r>
-              <a:rPr lang="en-US" smtClean="0"/>
+              <a:rPr lang="en-US"/>
               <a:t>Third level</a:t>
             </a:r>
           </a:p>
           <a:p>
             <a:pPr lvl="3"/>
             <a:r>
-              <a:rPr lang="en-US" smtClean="0"/>
+              <a:rPr lang="en-US"/>
               <a:t>Fourth level</a:t>
             </a:r>
           </a:p>
           <a:p>
             <a:pPr lvl="4"/>
             <a:r>
-              <a:rPr lang="en-US" smtClean="0"/>
+              <a:rPr lang="en-US"/>
               <a:t>Fifth level</a:t>
             </a:r>
-            <a:endParaRPr lang="en-US"/>
           </a:p>
         </p:txBody>
       </p:sp>
@@ -463,7 +475,7 @@
           <a:p>
             <a:fld id="{95118352-742C-7B43-8F22-628C53C0DDC2}" type="datetimeFigureOut">
               <a:rPr lang="en-US" smtClean="0"/>
-              <a:t>11/14/15</a:t>
+              <a:t>10/24/19</a:t>
             </a:fld>
             <a:endParaRPr lang="en-US"/>
           </a:p>
@@ -562,10 +574,9 @@
           <a:lstStyle/>
           <a:p>
             <a:r>
-              <a:rPr lang="en-US" smtClean="0"/>
+              <a:rPr lang="en-US"/>
               <a:t>Click to edit Master title style</a:t>
             </a:r>
-            <a:endParaRPr lang="en-US"/>
           </a:p>
         </p:txBody>
       </p:sp>
@@ -591,38 +602,37 @@
           <a:p>
             <a:pPr lvl="0"/>
             <a:r>
-              <a:rPr lang="en-US" smtClean="0"/>
+              <a:rPr lang="en-US"/>
               <a:t>Click to edit Master text styles</a:t>
             </a:r>
           </a:p>
           <a:p>
             <a:pPr lvl="1"/>
             <a:r>
-              <a:rPr lang="en-US" smtClean="0"/>
+              <a:rPr lang="en-US"/>
               <a:t>Second level</a:t>
             </a:r>
           </a:p>
           <a:p>
             <a:pPr lvl="2"/>
             <a:r>
-              <a:rPr lang="en-US" smtClean="0"/>
+              <a:rPr lang="en-US"/>
               <a:t>Third level</a:t>
             </a:r>
           </a:p>
           <a:p>
             <a:pPr lvl="3"/>
             <a:r>
-              <a:rPr lang="en-US" smtClean="0"/>
+              <a:rPr lang="en-US"/>
               <a:t>Fourth level</a:t>
             </a:r>
           </a:p>
           <a:p>
             <a:pPr lvl="4"/>
             <a:r>
-              <a:rPr lang="en-US" smtClean="0"/>
+              <a:rPr lang="en-US"/>
               <a:t>Fifth level</a:t>
             </a:r>
-            <a:endParaRPr lang="en-US"/>
           </a:p>
         </p:txBody>
       </p:sp>
@@ -643,7 +653,7 @@
           <a:p>
             <a:fld id="{95118352-742C-7B43-8F22-628C53C0DDC2}" type="datetimeFigureOut">
               <a:rPr lang="en-US" smtClean="0"/>
-              <a:t>11/14/15</a:t>
+              <a:t>10/24/19</a:t>
             </a:fld>
             <a:endParaRPr lang="en-US"/>
           </a:p>
@@ -737,10 +747,9 @@
           <a:lstStyle/>
           <a:p>
             <a:r>
-              <a:rPr lang="en-US" smtClean="0"/>
+              <a:rPr lang="en-US"/>
               <a:t>Click to edit Master title style</a:t>
             </a:r>
-            <a:endParaRPr lang="en-US"/>
           </a:p>
         </p:txBody>
       </p:sp>
@@ -761,38 +770,37 @@
           <a:p>
             <a:pPr lvl="0"/>
             <a:r>
-              <a:rPr lang="en-US" smtClean="0"/>
+              <a:rPr lang="en-US"/>
               <a:t>Click to edit Master text styles</a:t>
             </a:r>
           </a:p>
           <a:p>
             <a:pPr lvl="1"/>
             <a:r>
-              <a:rPr lang="en-US" smtClean="0"/>
+              <a:rPr lang="en-US"/>
               <a:t>Second level</a:t>
             </a:r>
           </a:p>
           <a:p>
             <a:pPr lvl="2"/>
             <a:r>
-              <a:rPr lang="en-US" smtClean="0"/>
+              <a:rPr lang="en-US"/>
               <a:t>Third level</a:t>
             </a:r>
           </a:p>
           <a:p>
             <a:pPr lvl="3"/>
             <a:r>
-              <a:rPr lang="en-US" smtClean="0"/>
+              <a:rPr lang="en-US"/>
               <a:t>Fourth level</a:t>
             </a:r>
           </a:p>
           <a:p>
             <a:pPr lvl="4"/>
             <a:r>
-              <a:rPr lang="en-US" smtClean="0"/>
+              <a:rPr lang="en-US"/>
               <a:t>Fifth level</a:t>
             </a:r>
-            <a:endParaRPr lang="en-US"/>
           </a:p>
         </p:txBody>
       </p:sp>
@@ -813,7 +821,7 @@
           <a:p>
             <a:fld id="{95118352-742C-7B43-8F22-628C53C0DDC2}" type="datetimeFigureOut">
               <a:rPr lang="en-US" smtClean="0"/>
-              <a:t>11/14/15</a:t>
+              <a:t>10/24/19</a:t>
             </a:fld>
             <a:endParaRPr lang="en-US"/>
           </a:p>
@@ -916,10 +924,9 @@
           </a:lstStyle>
           <a:p>
             <a:r>
-              <a:rPr lang="en-US" smtClean="0"/>
+              <a:rPr lang="en-US"/>
               <a:t>Click to edit Master title style</a:t>
             </a:r>
-            <a:endParaRPr lang="en-US"/>
           </a:p>
         </p:txBody>
       </p:sp>
@@ -1036,7 +1043,7 @@
           <a:p>
             <a:pPr lvl="0"/>
             <a:r>
-              <a:rPr lang="en-US" smtClean="0"/>
+              <a:rPr lang="en-US"/>
               <a:t>Click to edit Master text styles</a:t>
             </a:r>
           </a:p>
@@ -1059,7 +1066,7 @@
           <a:p>
             <a:fld id="{95118352-742C-7B43-8F22-628C53C0DDC2}" type="datetimeFigureOut">
               <a:rPr lang="en-US" smtClean="0"/>
-              <a:t>11/14/15</a:t>
+              <a:t>10/24/19</a:t>
             </a:fld>
             <a:endParaRPr lang="en-US"/>
           </a:p>
@@ -1153,10 +1160,9 @@
           <a:lstStyle/>
           <a:p>
             <a:r>
-              <a:rPr lang="en-US" smtClean="0"/>
+              <a:rPr lang="en-US"/>
               <a:t>Click to edit Master title style</a:t>
             </a:r>
-            <a:endParaRPr lang="en-US"/>
           </a:p>
         </p:txBody>
       </p:sp>
@@ -1210,38 +1216,37 @@
           <a:p>
             <a:pPr lvl="0"/>
             <a:r>
-              <a:rPr lang="en-US" smtClean="0"/>
+              <a:rPr lang="en-US"/>
               <a:t>Click to edit Master text styles</a:t>
             </a:r>
           </a:p>
           <a:p>
             <a:pPr lvl="1"/>
             <a:r>
-              <a:rPr lang="en-US" smtClean="0"/>
+              <a:rPr lang="en-US"/>
               <a:t>Second level</a:t>
             </a:r>
           </a:p>
           <a:p>
             <a:pPr lvl="2"/>
             <a:r>
-              <a:rPr lang="en-US" smtClean="0"/>
+              <a:rPr lang="en-US"/>
               <a:t>Third level</a:t>
             </a:r>
           </a:p>
           <a:p>
             <a:pPr lvl="3"/>
             <a:r>
-              <a:rPr lang="en-US" smtClean="0"/>
+              <a:rPr lang="en-US"/>
               <a:t>Fourth level</a:t>
             </a:r>
           </a:p>
           <a:p>
             <a:pPr lvl="4"/>
             <a:r>
-              <a:rPr lang="en-US" smtClean="0"/>
+              <a:rPr lang="en-US"/>
               <a:t>Fifth level</a:t>
             </a:r>
-            <a:endParaRPr lang="en-US"/>
           </a:p>
         </p:txBody>
       </p:sp>
@@ -1295,38 +1300,37 @@
           <a:p>
             <a:pPr lvl="0"/>
             <a:r>
-              <a:rPr lang="en-US" smtClean="0"/>
+              <a:rPr lang="en-US"/>
               <a:t>Click to edit Master text styles</a:t>
             </a:r>
           </a:p>
           <a:p>
             <a:pPr lvl="1"/>
             <a:r>
-              <a:rPr lang="en-US" smtClean="0"/>
+              <a:rPr lang="en-US"/>
               <a:t>Second level</a:t>
             </a:r>
           </a:p>
           <a:p>
             <a:pPr lvl="2"/>
             <a:r>
-              <a:rPr lang="en-US" smtClean="0"/>
+              <a:rPr lang="en-US"/>
               <a:t>Third level</a:t>
             </a:r>
           </a:p>
           <a:p>
             <a:pPr lvl="3"/>
             <a:r>
-              <a:rPr lang="en-US" smtClean="0"/>
+              <a:rPr lang="en-US"/>
               <a:t>Fourth level</a:t>
             </a:r>
           </a:p>
           <a:p>
             <a:pPr lvl="4"/>
             <a:r>
-              <a:rPr lang="en-US" smtClean="0"/>
+              <a:rPr lang="en-US"/>
               <a:t>Fifth level</a:t>
             </a:r>
-            <a:endParaRPr lang="en-US"/>
           </a:p>
         </p:txBody>
       </p:sp>
@@ -1347,7 +1351,7 @@
           <a:p>
             <a:fld id="{95118352-742C-7B43-8F22-628C53C0DDC2}" type="datetimeFigureOut">
               <a:rPr lang="en-US" smtClean="0"/>
-              <a:t>11/14/15</a:t>
+              <a:t>10/24/19</a:t>
             </a:fld>
             <a:endParaRPr lang="en-US"/>
           </a:p>
@@ -1445,10 +1449,9 @@
           </a:lstStyle>
           <a:p>
             <a:r>
-              <a:rPr lang="en-US" smtClean="0"/>
+              <a:rPr lang="en-US"/>
               <a:t>Click to edit Master title style</a:t>
             </a:r>
-            <a:endParaRPr lang="en-US"/>
           </a:p>
         </p:txBody>
       </p:sp>
@@ -1511,7 +1514,7 @@
           <a:p>
             <a:pPr lvl="0"/>
             <a:r>
-              <a:rPr lang="en-US" smtClean="0"/>
+              <a:rPr lang="en-US"/>
               <a:t>Click to edit Master text styles</a:t>
             </a:r>
           </a:p>
@@ -1567,38 +1570,37 @@
           <a:p>
             <a:pPr lvl="0"/>
             <a:r>
-              <a:rPr lang="en-US" smtClean="0"/>
+              <a:rPr lang="en-US"/>
               <a:t>Click to edit Master text styles</a:t>
             </a:r>
           </a:p>
           <a:p>
             <a:pPr lvl="1"/>
             <a:r>
-              <a:rPr lang="en-US" smtClean="0"/>
+              <a:rPr lang="en-US"/>
               <a:t>Second level</a:t>
             </a:r>
           </a:p>
           <a:p>
             <a:pPr lvl="2"/>
             <a:r>
-              <a:rPr lang="en-US" smtClean="0"/>
+              <a:rPr lang="en-US"/>
               <a:t>Third level</a:t>
             </a:r>
           </a:p>
           <a:p>
             <a:pPr lvl="3"/>
             <a:r>
-              <a:rPr lang="en-US" smtClean="0"/>
+              <a:rPr lang="en-US"/>
               <a:t>Fourth level</a:t>
             </a:r>
           </a:p>
           <a:p>
             <a:pPr lvl="4"/>
             <a:r>
-              <a:rPr lang="en-US" smtClean="0"/>
+              <a:rPr lang="en-US"/>
               <a:t>Fifth level</a:t>
             </a:r>
-            <a:endParaRPr lang="en-US"/>
           </a:p>
         </p:txBody>
       </p:sp>
@@ -1661,7 +1663,7 @@
           <a:p>
             <a:pPr lvl="0"/>
             <a:r>
-              <a:rPr lang="en-US" smtClean="0"/>
+              <a:rPr lang="en-US"/>
               <a:t>Click to edit Master text styles</a:t>
             </a:r>
           </a:p>
@@ -1717,38 +1719,37 @@
           <a:p>
             <a:pPr lvl="0"/>
             <a:r>
-              <a:rPr lang="en-US" smtClean="0"/>
+              <a:rPr lang="en-US"/>
               <a:t>Click to edit Master text styles</a:t>
             </a:r>
           </a:p>
           <a:p>
             <a:pPr lvl="1"/>
             <a:r>
-              <a:rPr lang="en-US" smtClean="0"/>
+              <a:rPr lang="en-US"/>
               <a:t>Second level</a:t>
             </a:r>
           </a:p>
           <a:p>
             <a:pPr lvl="2"/>
             <a:r>
-              <a:rPr lang="en-US" smtClean="0"/>
+              <a:rPr lang="en-US"/>
               <a:t>Third level</a:t>
             </a:r>
           </a:p>
           <a:p>
             <a:pPr lvl="3"/>
             <a:r>
-              <a:rPr lang="en-US" smtClean="0"/>
+              <a:rPr lang="en-US"/>
               <a:t>Fourth level</a:t>
             </a:r>
           </a:p>
           <a:p>
             <a:pPr lvl="4"/>
             <a:r>
-              <a:rPr lang="en-US" smtClean="0"/>
+              <a:rPr lang="en-US"/>
               <a:t>Fifth level</a:t>
             </a:r>
-            <a:endParaRPr lang="en-US"/>
           </a:p>
         </p:txBody>
       </p:sp>
@@ -1769,7 +1770,7 @@
           <a:p>
             <a:fld id="{95118352-742C-7B43-8F22-628C53C0DDC2}" type="datetimeFigureOut">
               <a:rPr lang="en-US" smtClean="0"/>
-              <a:t>11/14/15</a:t>
+              <a:t>10/24/19</a:t>
             </a:fld>
             <a:endParaRPr lang="en-US"/>
           </a:p>
@@ -1863,10 +1864,9 @@
           <a:lstStyle/>
           <a:p>
             <a:r>
-              <a:rPr lang="en-US" smtClean="0"/>
+              <a:rPr lang="en-US"/>
               <a:t>Click to edit Master title style</a:t>
             </a:r>
-            <a:endParaRPr lang="en-US"/>
           </a:p>
         </p:txBody>
       </p:sp>
@@ -1887,7 +1887,7 @@
           <a:p>
             <a:fld id="{95118352-742C-7B43-8F22-628C53C0DDC2}" type="datetimeFigureOut">
               <a:rPr lang="en-US" smtClean="0"/>
-              <a:t>11/14/15</a:t>
+              <a:t>10/24/19</a:t>
             </a:fld>
             <a:endParaRPr lang="en-US"/>
           </a:p>
@@ -1982,7 +1982,7 @@
           <a:p>
             <a:fld id="{95118352-742C-7B43-8F22-628C53C0DDC2}" type="datetimeFigureOut">
               <a:rPr lang="en-US" smtClean="0"/>
-              <a:t>11/14/15</a:t>
+              <a:t>10/24/19</a:t>
             </a:fld>
             <a:endParaRPr lang="en-US"/>
           </a:p>
@@ -2085,10 +2085,9 @@
           </a:lstStyle>
           <a:p>
             <a:r>
-              <a:rPr lang="en-US" smtClean="0"/>
+              <a:rPr lang="en-US"/>
               <a:t>Click to edit Master title style</a:t>
             </a:r>
-            <a:endParaRPr lang="en-US"/>
           </a:p>
         </p:txBody>
       </p:sp>
@@ -2142,38 +2141,37 @@
           <a:p>
             <a:pPr lvl="0"/>
             <a:r>
-              <a:rPr lang="en-US" smtClean="0"/>
+              <a:rPr lang="en-US"/>
               <a:t>Click to edit Master text styles</a:t>
             </a:r>
           </a:p>
           <a:p>
             <a:pPr lvl="1"/>
             <a:r>
-              <a:rPr lang="en-US" smtClean="0"/>
+              <a:rPr lang="en-US"/>
               <a:t>Second level</a:t>
             </a:r>
           </a:p>
           <a:p>
             <a:pPr lvl="2"/>
             <a:r>
-              <a:rPr lang="en-US" smtClean="0"/>
+              <a:rPr lang="en-US"/>
               <a:t>Third level</a:t>
             </a:r>
           </a:p>
           <a:p>
             <a:pPr lvl="3"/>
             <a:r>
-              <a:rPr lang="en-US" smtClean="0"/>
+              <a:rPr lang="en-US"/>
               <a:t>Fourth level</a:t>
             </a:r>
           </a:p>
           <a:p>
             <a:pPr lvl="4"/>
             <a:r>
-              <a:rPr lang="en-US" smtClean="0"/>
+              <a:rPr lang="en-US"/>
               <a:t>Fifth level</a:t>
             </a:r>
-            <a:endParaRPr lang="en-US"/>
           </a:p>
         </p:txBody>
       </p:sp>
@@ -2236,7 +2234,7 @@
           <a:p>
             <a:pPr lvl="0"/>
             <a:r>
-              <a:rPr lang="en-US" smtClean="0"/>
+              <a:rPr lang="en-US"/>
               <a:t>Click to edit Master text styles</a:t>
             </a:r>
           </a:p>
@@ -2259,7 +2257,7 @@
           <a:p>
             <a:fld id="{95118352-742C-7B43-8F22-628C53C0DDC2}" type="datetimeFigureOut">
               <a:rPr lang="en-US" smtClean="0"/>
-              <a:t>11/14/15</a:t>
+              <a:t>10/24/19</a:t>
             </a:fld>
             <a:endParaRPr lang="en-US"/>
           </a:p>
@@ -2362,10 +2360,9 @@
           </a:lstStyle>
           <a:p>
             <a:r>
-              <a:rPr lang="en-US" smtClean="0"/>
+              <a:rPr lang="en-US"/>
               <a:t>Click to edit Master title style</a:t>
             </a:r>
-            <a:endParaRPr lang="en-US"/>
           </a:p>
         </p:txBody>
       </p:sp>
@@ -2489,7 +2486,7 @@
           <a:p>
             <a:pPr lvl="0"/>
             <a:r>
-              <a:rPr lang="en-US" smtClean="0"/>
+              <a:rPr lang="en-US"/>
               <a:t>Click to edit Master text styles</a:t>
             </a:r>
           </a:p>
@@ -2512,7 +2509,7 @@
           <a:p>
             <a:fld id="{95118352-742C-7B43-8F22-628C53C0DDC2}" type="datetimeFigureOut">
               <a:rPr lang="en-US" smtClean="0"/>
-              <a:t>11/14/15</a:t>
+              <a:t>10/24/19</a:t>
             </a:fld>
             <a:endParaRPr lang="en-US"/>
           </a:p>
@@ -2621,10 +2618,9 @@
           <a:lstStyle/>
           <a:p>
             <a:r>
-              <a:rPr lang="en-US" smtClean="0"/>
+              <a:rPr lang="en-US"/>
               <a:t>Click to edit Master title style</a:t>
             </a:r>
-            <a:endParaRPr lang="en-US"/>
           </a:p>
         </p:txBody>
       </p:sp>
@@ -2655,38 +2651,37 @@
           <a:p>
             <a:pPr lvl="0"/>
             <a:r>
-              <a:rPr lang="en-US" smtClean="0"/>
+              <a:rPr lang="en-US"/>
               <a:t>Click to edit Master text styles</a:t>
             </a:r>
           </a:p>
           <a:p>
             <a:pPr lvl="1"/>
             <a:r>
-              <a:rPr lang="en-US" smtClean="0"/>
+              <a:rPr lang="en-US"/>
               <a:t>Second level</a:t>
             </a:r>
           </a:p>
           <a:p>
             <a:pPr lvl="2"/>
             <a:r>
-              <a:rPr lang="en-US" smtClean="0"/>
+              <a:rPr lang="en-US"/>
               <a:t>Third level</a:t>
             </a:r>
           </a:p>
           <a:p>
             <a:pPr lvl="3"/>
             <a:r>
-              <a:rPr lang="en-US" smtClean="0"/>
+              <a:rPr lang="en-US"/>
               <a:t>Fourth level</a:t>
             </a:r>
           </a:p>
           <a:p>
             <a:pPr lvl="4"/>
             <a:r>
-              <a:rPr lang="en-US" smtClean="0"/>
+              <a:rPr lang="en-US"/>
               <a:t>Fifth level</a:t>
             </a:r>
-            <a:endParaRPr lang="en-US"/>
           </a:p>
         </p:txBody>
       </p:sp>
@@ -2725,7 +2720,7 @@
           <a:p>
             <a:fld id="{95118352-742C-7B43-8F22-628C53C0DDC2}" type="datetimeFigureOut">
               <a:rPr lang="en-US" smtClean="0"/>
-              <a:t>11/14/15</a:t>
+              <a:t>10/24/19</a:t>
             </a:fld>
             <a:endParaRPr lang="en-US"/>
           </a:p>
@@ -3376,16 +3371,12 @@
             <a:lstStyle/>
             <a:p>
               <a:r>
-                <a:rPr lang="en-US" dirty="0" smtClean="0">
+                <a:rPr lang="en-US" dirty="0">
                   <a:latin typeface="Times New Roman"/>
                   <a:cs typeface="Times New Roman"/>
                 </a:rPr>
                 <a:t>Key point</a:t>
               </a:r>
-              <a:endParaRPr lang="en-US" dirty="0">
-                <a:latin typeface="Times New Roman"/>
-                <a:cs typeface="Times New Roman"/>
-              </a:endParaRPr>
             </a:p>
           </p:txBody>
         </p:sp>
@@ -3412,21 +3403,21 @@
             <a:lstStyle/>
             <a:p>
               <a:r>
-                <a:rPr lang="en-US" dirty="0" smtClean="0">
+                <a:rPr lang="en-US" dirty="0">
                   <a:latin typeface="Times New Roman"/>
                   <a:cs typeface="Times New Roman"/>
                 </a:rPr>
                 <a:t>1    </a:t>
               </a:r>
               <a:r>
-                <a:rPr lang="en-US" dirty="0" err="1" smtClean="0">
+                <a:rPr lang="en-US" dirty="0" err="1">
                   <a:latin typeface="Times New Roman"/>
                   <a:cs typeface="Times New Roman"/>
                 </a:rPr>
                 <a:t>Member_Total</a:t>
               </a:r>
               <a:r>
-                <a:rPr lang="en-US" dirty="0" smtClean="0">
+                <a:rPr lang="en-US" dirty="0">
                   <a:latin typeface="Times New Roman"/>
                   <a:cs typeface="Times New Roman"/>
                 </a:rPr>
@@ -3435,21 +3426,21 @@
             </a:p>
             <a:p>
               <a:r>
-                <a:rPr lang="en-US" dirty="0" smtClean="0">
+                <a:rPr lang="en-US" dirty="0">
                   <a:latin typeface="Times New Roman"/>
                   <a:cs typeface="Times New Roman"/>
                 </a:rPr>
                 <a:t>4    </a:t>
               </a:r>
               <a:r>
-                <a:rPr lang="en-US" dirty="0" err="1" smtClean="0">
+                <a:rPr lang="en-US" dirty="0" err="1">
                   <a:latin typeface="Times New Roman"/>
                   <a:cs typeface="Times New Roman"/>
                 </a:rPr>
                 <a:t>KP_Total</a:t>
               </a:r>
               <a:r>
-                <a:rPr lang="en-US" dirty="0" smtClean="0">
+                <a:rPr lang="en-US" dirty="0">
                   <a:latin typeface="Times New Roman"/>
                   <a:cs typeface="Times New Roman"/>
                 </a:rPr>
@@ -3458,16 +3449,12 @@
             </a:p>
             <a:p>
               <a:r>
-                <a:rPr lang="en-US" dirty="0" smtClean="0">
+                <a:rPr lang="en-US" dirty="0">
                   <a:latin typeface="Times New Roman"/>
                   <a:cs typeface="Times New Roman"/>
                 </a:rPr>
                 <a:t>1        4</a:t>
               </a:r>
-              <a:endParaRPr lang="en-US" dirty="0">
-                <a:latin typeface="Times New Roman"/>
-                <a:cs typeface="Times New Roman"/>
-              </a:endParaRPr>
             </a:p>
           </p:txBody>
         </p:sp>
@@ -3577,16 +3564,12 @@
             <a:lstStyle/>
             <a:p>
               <a:r>
-                <a:rPr lang="en-US" dirty="0" smtClean="0">
+                <a:rPr lang="en-US" dirty="0">
                   <a:latin typeface="Times New Roman"/>
                   <a:cs typeface="Times New Roman"/>
                 </a:rPr>
                 <a:t>Key point</a:t>
               </a:r>
-              <a:endParaRPr lang="en-US" dirty="0">
-                <a:latin typeface="Times New Roman"/>
-                <a:cs typeface="Times New Roman"/>
-              </a:endParaRPr>
             </a:p>
           </p:txBody>
         </p:sp>
@@ -3613,21 +3596,21 @@
             <a:lstStyle/>
             <a:p>
               <a:r>
-                <a:rPr lang="en-US" dirty="0" smtClean="0">
+                <a:rPr lang="en-US" dirty="0">
                   <a:latin typeface="Times New Roman"/>
                   <a:cs typeface="Times New Roman"/>
                 </a:rPr>
                 <a:t>2    </a:t>
               </a:r>
               <a:r>
-                <a:rPr lang="en-US" dirty="0" err="1" smtClean="0">
+                <a:rPr lang="en-US" dirty="0" err="1">
                   <a:latin typeface="Times New Roman"/>
                   <a:cs typeface="Times New Roman"/>
                 </a:rPr>
                 <a:t>Member_Total</a:t>
               </a:r>
               <a:r>
-                <a:rPr lang="en-US" dirty="0" smtClean="0">
+                <a:rPr lang="en-US" dirty="0">
                   <a:latin typeface="Times New Roman"/>
                   <a:cs typeface="Times New Roman"/>
                 </a:rPr>
@@ -3636,21 +3619,21 @@
             </a:p>
             <a:p>
               <a:r>
-                <a:rPr lang="en-US" dirty="0" smtClean="0">
+                <a:rPr lang="en-US" dirty="0">
                   <a:latin typeface="Times New Roman"/>
                   <a:cs typeface="Times New Roman"/>
                 </a:rPr>
                 <a:t>6    </a:t>
               </a:r>
               <a:r>
-                <a:rPr lang="en-US" dirty="0" err="1" smtClean="0">
+                <a:rPr lang="en-US" dirty="0" err="1">
                   <a:latin typeface="Times New Roman"/>
                   <a:cs typeface="Times New Roman"/>
                 </a:rPr>
                 <a:t>KP_Total</a:t>
               </a:r>
               <a:r>
-                <a:rPr lang="en-US" dirty="0" smtClean="0">
+                <a:rPr lang="en-US" dirty="0">
                   <a:latin typeface="Times New Roman"/>
                   <a:cs typeface="Times New Roman"/>
                 </a:rPr>
@@ -3662,7 +3645,7 @@
                 <a:buAutoNum type="arabicPlain"/>
               </a:pPr>
               <a:r>
-                <a:rPr lang="en-US" dirty="0" smtClean="0">
+                <a:rPr lang="en-US" dirty="0">
                   <a:latin typeface="Times New Roman"/>
                   <a:cs typeface="Times New Roman"/>
                 </a:rPr>
@@ -3674,16 +3657,12 @@
                 <a:buAutoNum type="arabicPlain"/>
               </a:pPr>
               <a:r>
-                <a:rPr lang="en-US" dirty="0" smtClean="0">
+                <a:rPr lang="en-US" dirty="0">
                   <a:latin typeface="Times New Roman"/>
                   <a:cs typeface="Times New Roman"/>
                 </a:rPr>
                 <a:t>  3</a:t>
               </a:r>
-              <a:endParaRPr lang="en-US" dirty="0">
-                <a:latin typeface="Times New Roman"/>
-                <a:cs typeface="Times New Roman"/>
-              </a:endParaRPr>
             </a:p>
           </p:txBody>
         </p:sp>
@@ -4081,7 +4060,7 @@
             <a:p>
               <a:pPr algn="ctr"/>
               <a:r>
-                <a:rPr lang="en-US" dirty="0" smtClean="0"/>
+                <a:rPr lang="en-US" dirty="0"/>
                 <a:t>FAST 8 Driver</a:t>
               </a:r>
             </a:p>
@@ -4091,7 +4070,7 @@
                 <a:buChar char="•"/>
               </a:pPr>
               <a:r>
-                <a:rPr lang="en-US" dirty="0" smtClean="0"/>
+                <a:rPr lang="en-US" dirty="0"/>
                 <a:t>Drives time-domain solution forward</a:t>
               </a:r>
             </a:p>
@@ -4101,7 +4080,7 @@
                 <a:buChar char="•"/>
               </a:pPr>
               <a:r>
-                <a:rPr lang="en-US" dirty="0" smtClean="0"/>
+                <a:rPr lang="en-US" dirty="0"/>
                 <a:t>Calls individual modules</a:t>
               </a:r>
             </a:p>
@@ -4111,10 +4090,9 @@
                 <a:buChar char="•"/>
               </a:pPr>
               <a:r>
-                <a:rPr lang="en-US" dirty="0" smtClean="0"/>
+                <a:rPr lang="en-US" dirty="0"/>
                 <a:t>Derives module inputs from outputs</a:t>
               </a:r>
-              <a:endParaRPr lang="en-US" dirty="0"/>
             </a:p>
           </p:txBody>
         </p:sp>
@@ -4153,18 +4131,18 @@
             <a:p>
               <a:pPr algn="ctr"/>
               <a:r>
-                <a:rPr lang="en-US" dirty="0" err="1" smtClean="0"/>
+                <a:rPr lang="en-US" dirty="0" err="1"/>
                 <a:t>ElastoDyn</a:t>
               </a:r>
-              <a:endParaRPr lang="en-US" dirty="0" smtClean="0"/>
+              <a:endParaRPr lang="en-US" dirty="0"/>
             </a:p>
             <a:p>
               <a:pPr algn="ctr"/>
               <a:r>
-                <a:rPr lang="en-US" dirty="0" err="1" smtClean="0"/>
+                <a:rPr lang="en-US" dirty="0" err="1"/>
                 <a:t>ServoDyn</a:t>
               </a:r>
-              <a:endParaRPr lang="en-US" dirty="0" smtClean="0"/>
+              <a:endParaRPr lang="en-US" dirty="0"/>
             </a:p>
           </p:txBody>
         </p:sp>
@@ -4209,7 +4187,7 @@
                 <a:buChar char="•"/>
               </a:pPr>
               <a:r>
-                <a:rPr lang="en-US" sz="1200" dirty="0" smtClean="0"/>
+                <a:rPr lang="en-US" sz="1200" dirty="0"/>
                 <a:t>Root motion</a:t>
               </a:r>
             </a:p>
@@ -4259,7 +4237,7 @@
                 <a:buChar char="•"/>
               </a:pPr>
               <a:r>
-                <a:rPr lang="en-US" sz="1200" dirty="0" smtClean="0"/>
+                <a:rPr lang="en-US" sz="1200" dirty="0"/>
                 <a:t>Root reaction loads</a:t>
               </a:r>
             </a:p>
@@ -4300,10 +4278,10 @@
             <a:p>
               <a:pPr algn="ctr"/>
               <a:r>
-                <a:rPr lang="en-US" dirty="0" err="1" smtClean="0"/>
+                <a:rPr lang="en-US" dirty="0" err="1"/>
                 <a:t>AeroDyn</a:t>
               </a:r>
-              <a:endParaRPr lang="en-US" dirty="0" smtClean="0"/>
+              <a:endParaRPr lang="en-US" dirty="0"/>
             </a:p>
           </p:txBody>
         </p:sp>
@@ -4348,7 +4326,7 @@
                 <a:buChar char="•"/>
               </a:pPr>
               <a:r>
-                <a:rPr lang="en-US" sz="1200" dirty="0" smtClean="0"/>
+                <a:rPr lang="en-US" sz="1200" dirty="0"/>
                 <a:t>Aerodynamic loads</a:t>
               </a:r>
             </a:p>
@@ -4395,7 +4373,7 @@
                 <a:buChar char="•"/>
               </a:pPr>
               <a:r>
-                <a:rPr lang="en-US" sz="1200" dirty="0" smtClean="0"/>
+                <a:rPr lang="en-US" sz="1200" dirty="0"/>
                 <a:t>Blade motion</a:t>
               </a:r>
             </a:p>
@@ -4708,10 +4686,10 @@
             <a:p>
               <a:pPr algn="ctr"/>
               <a:r>
-                <a:rPr lang="en-US" dirty="0" err="1" smtClean="0"/>
+                <a:rPr lang="en-US" dirty="0" err="1"/>
                 <a:t>BeamDyn</a:t>
               </a:r>
-              <a:endParaRPr lang="en-US" dirty="0" smtClean="0"/>
+              <a:endParaRPr lang="en-US" dirty="0"/>
             </a:p>
           </p:txBody>
         </p:sp>
@@ -4756,7 +4734,7 @@
                 <a:buChar char="•"/>
               </a:pPr>
               <a:r>
-                <a:rPr lang="en-US" sz="1200" dirty="0" smtClean="0"/>
+                <a:rPr lang="en-US" sz="1200" dirty="0"/>
                 <a:t>Root motion</a:t>
               </a:r>
             </a:p>
@@ -4766,7 +4744,7 @@
                 <a:buChar char="•"/>
               </a:pPr>
               <a:r>
-                <a:rPr lang="en-US" sz="1200" dirty="0" smtClean="0"/>
+                <a:rPr lang="en-US" sz="1200" dirty="0"/>
                 <a:t>Aerodynamic applied loads</a:t>
               </a:r>
             </a:p>
@@ -4813,7 +4791,7 @@
                 <a:buChar char="•"/>
               </a:pPr>
               <a:r>
-                <a:rPr lang="en-US" sz="1200" dirty="0" smtClean="0"/>
+                <a:rPr lang="en-US" sz="1200" dirty="0"/>
                 <a:t>Blade motion</a:t>
               </a:r>
             </a:p>
@@ -4823,7 +4801,7 @@
                 <a:buChar char="•"/>
               </a:pPr>
               <a:r>
-                <a:rPr lang="en-US" sz="1200" dirty="0" smtClean="0"/>
+                <a:rPr lang="en-US" sz="1200" dirty="0"/>
                 <a:t>Root reaction force</a:t>
               </a:r>
             </a:p>
@@ -5000,14 +4978,14 @@
             <a:p>
               <a:pPr algn="ctr"/>
               <a:r>
-                <a:rPr lang="en-US" dirty="0" smtClean="0"/>
+                <a:rPr lang="en-US" dirty="0"/>
                 <a:t>Other</a:t>
               </a:r>
             </a:p>
             <a:p>
               <a:pPr algn="ctr"/>
               <a:r>
-                <a:rPr lang="en-US" dirty="0" smtClean="0"/>
+                <a:rPr lang="en-US" dirty="0"/>
                 <a:t>Modules</a:t>
               </a:r>
             </a:p>
@@ -5152,13 +5130,6 @@
   <p:clrMapOvr>
     <a:masterClrMapping/>
   </p:clrMapOvr>
-  <p:timing>
-    <p:tnLst>
-      <p:par>
-        <p:cTn xmlns:p14="http://schemas.microsoft.com/office/powerpoint/2010/main" id="1" dur="indefinite" restart="never" nodeType="tmRoot"/>
-      </p:par>
-    </p:tnLst>
-  </p:timing>
 </p:sld>
 </file>
 
@@ -5458,10 +5429,9 @@
               <a:lstStyle/>
               <a:p>
                 <a:r>
-                  <a:rPr lang="en-US" b="1" dirty="0" smtClean="0"/>
+                  <a:rPr lang="en-US" b="1" dirty="0"/>
                   <a:t>Z</a:t>
                 </a:r>
-                <a:endParaRPr lang="en-US" b="1" dirty="0"/>
               </a:p>
             </p:txBody>
           </p:sp>
@@ -5488,10 +5458,9 @@
               <a:lstStyle/>
               <a:p>
                 <a:r>
-                  <a:rPr lang="en-US" b="1" dirty="0" smtClean="0"/>
+                  <a:rPr lang="en-US" b="1" dirty="0"/>
                   <a:t>X</a:t>
                 </a:r>
-                <a:endParaRPr lang="en-US" b="1" dirty="0"/>
               </a:p>
             </p:txBody>
           </p:sp>
@@ -5518,10 +5487,9 @@
               <a:lstStyle/>
               <a:p>
                 <a:r>
-                  <a:rPr lang="en-US" b="1" dirty="0" smtClean="0"/>
+                  <a:rPr lang="en-US" b="1" dirty="0"/>
                   <a:t>Y</a:t>
                 </a:r>
-                <a:endParaRPr lang="en-US" b="1" dirty="0"/>
               </a:p>
             </p:txBody>
           </p:sp>
@@ -5548,14 +5516,13 @@
               <a:lstStyle/>
               <a:p>
                 <a:r>
-                  <a:rPr lang="en-US" dirty="0" smtClean="0"/>
+                  <a:rPr lang="en-US" dirty="0"/>
                   <a:t>Z</a:t>
                 </a:r>
                 <a:r>
-                  <a:rPr lang="en-US" baseline="-25000" dirty="0" smtClean="0"/>
+                  <a:rPr lang="en-US" baseline="-25000" dirty="0"/>
                   <a:t>r0</a:t>
                 </a:r>
-                <a:endParaRPr lang="en-US" baseline="-25000" dirty="0"/>
               </a:p>
             </p:txBody>
           </p:sp>
@@ -5582,14 +5549,13 @@
               <a:lstStyle/>
               <a:p>
                 <a:r>
-                  <a:rPr lang="en-US" dirty="0" smtClean="0"/>
+                  <a:rPr lang="en-US" dirty="0"/>
                   <a:t>X</a:t>
                 </a:r>
                 <a:r>
-                  <a:rPr lang="en-US" baseline="-25000" dirty="0" smtClean="0"/>
+                  <a:rPr lang="en-US" baseline="-25000" dirty="0"/>
                   <a:t>r0</a:t>
                 </a:r>
-                <a:endParaRPr lang="en-US" baseline="-25000" dirty="0"/>
               </a:p>
             </p:txBody>
           </p:sp>
@@ -5616,14 +5582,13 @@
               <a:lstStyle/>
               <a:p>
                 <a:r>
-                  <a:rPr lang="en-US" dirty="0" smtClean="0"/>
+                  <a:rPr lang="en-US" dirty="0"/>
                   <a:t>Y</a:t>
                 </a:r>
                 <a:r>
-                  <a:rPr lang="en-US" baseline="-25000" dirty="0" smtClean="0"/>
+                  <a:rPr lang="en-US" baseline="-25000" dirty="0"/>
                   <a:t>r0</a:t>
                 </a:r>
-                <a:endParaRPr lang="en-US" baseline="-25000" dirty="0"/>
               </a:p>
             </p:txBody>
           </p:sp>
@@ -5683,10 +5648,9 @@
               <a:lstStyle/>
               <a:p>
                 <a:r>
-                  <a:rPr lang="en-US" b="1" dirty="0" smtClean="0"/>
+                  <a:rPr lang="en-US" b="1" dirty="0"/>
                   <a:t>O</a:t>
                 </a:r>
-                <a:endParaRPr lang="en-US" b="1" dirty="0"/>
               </a:p>
             </p:txBody>
           </p:sp>
@@ -5713,14 +5677,13 @@
               <a:lstStyle/>
               <a:p>
                 <a:r>
-                  <a:rPr lang="en-US" dirty="0" smtClean="0"/>
+                  <a:rPr lang="en-US" dirty="0"/>
                   <a:t>O</a:t>
                 </a:r>
                 <a:r>
-                  <a:rPr lang="en-US" baseline="-25000" dirty="0" smtClean="0"/>
+                  <a:rPr lang="en-US" baseline="-25000" dirty="0"/>
                   <a:t>r0</a:t>
                 </a:r>
-                <a:endParaRPr lang="en-US" baseline="-25000" dirty="0"/>
               </a:p>
             </p:txBody>
           </p:sp>
@@ -5747,26 +5710,25 @@
               <a:lstStyle/>
               <a:p>
                 <a:r>
-                  <a:rPr lang="en-US" dirty="0" smtClean="0"/>
+                  <a:rPr lang="en-US" dirty="0"/>
                   <a:t>r</a:t>
                 </a:r>
                 <a:r>
-                  <a:rPr lang="en-US" baseline="-25000" dirty="0" smtClean="0"/>
+                  <a:rPr lang="en-US" baseline="-25000" dirty="0"/>
                   <a:t>0</a:t>
                 </a:r>
                 <a:r>
-                  <a:rPr lang="en-US" dirty="0" smtClean="0"/>
+                  <a:rPr lang="en-US" dirty="0"/>
                   <a:t> (</a:t>
                 </a:r>
                 <a:r>
-                  <a:rPr lang="en-US" dirty="0" err="1" smtClean="0"/>
+                  <a:rPr lang="en-US" dirty="0" err="1"/>
                   <a:t>GlbPos</a:t>
                 </a:r>
                 <a:r>
-                  <a:rPr lang="en-US" dirty="0" smtClean="0"/>
+                  <a:rPr lang="en-US" dirty="0"/>
                   <a:t>)</a:t>
                 </a:r>
-                <a:endParaRPr lang="en-US" dirty="0"/>
               </a:p>
             </p:txBody>
           </p:sp>
@@ -5926,11 +5888,11 @@
             <a:lstStyle/>
             <a:p>
               <a:r>
-                <a:rPr lang="en-US" dirty="0" err="1" smtClean="0"/>
+                <a:rPr lang="en-US" dirty="0" err="1"/>
                 <a:t>Z</a:t>
               </a:r>
               <a:r>
-                <a:rPr lang="en-US" baseline="-25000" dirty="0" err="1" smtClean="0"/>
+                <a:rPr lang="en-US" baseline="-25000" dirty="0" err="1"/>
                 <a:t>rt</a:t>
               </a:r>
               <a:endParaRPr lang="en-US" baseline="-25000" dirty="0"/>
@@ -5964,7 +5926,7 @@
                 <a:t>X</a:t>
               </a:r>
               <a:r>
-                <a:rPr lang="en-US" baseline="-25000" dirty="0" err="1" smtClean="0"/>
+                <a:rPr lang="en-US" baseline="-25000" dirty="0" err="1"/>
                 <a:t>rt</a:t>
               </a:r>
               <a:endParaRPr lang="en-US" baseline="-25000" dirty="0"/>
@@ -5998,7 +5960,7 @@
                 <a:t>Y</a:t>
               </a:r>
               <a:r>
-                <a:rPr lang="en-US" baseline="-25000" dirty="0" err="1" smtClean="0"/>
+                <a:rPr lang="en-US" baseline="-25000" dirty="0" err="1"/>
                 <a:t>rt</a:t>
               </a:r>
               <a:endParaRPr lang="en-US" baseline="-25000" dirty="0"/>
@@ -6028,11 +5990,11 @@
             <a:lstStyle/>
             <a:p>
               <a:r>
-                <a:rPr lang="en-US" dirty="0" err="1" smtClean="0"/>
+                <a:rPr lang="en-US" dirty="0" err="1"/>
                 <a:t>r</a:t>
               </a:r>
               <a:r>
-                <a:rPr lang="en-US" baseline="-25000" dirty="0" err="1" smtClean="0"/>
+                <a:rPr lang="en-US" baseline="-25000" dirty="0" err="1"/>
                 <a:t>t</a:t>
               </a:r>
               <a:endParaRPr lang="en-US" baseline="-25000" dirty="0"/>
@@ -6062,10 +6024,9 @@
             <a:lstStyle/>
             <a:p>
               <a:r>
-                <a:rPr lang="en-US" dirty="0" smtClean="0"/>
+                <a:rPr lang="en-US" dirty="0"/>
                 <a:t>Initial blade reference frame</a:t>
               </a:r>
-              <a:endParaRPr lang="en-US" dirty="0"/>
             </a:p>
           </p:txBody>
         </p:sp>
@@ -6130,10 +6091,9 @@
             <a:lstStyle/>
             <a:p>
               <a:r>
-                <a:rPr lang="en-US" dirty="0" smtClean="0"/>
+                <a:rPr lang="en-US" dirty="0"/>
                 <a:t>Global frame</a:t>
               </a:r>
-              <a:endParaRPr lang="en-US" dirty="0"/>
             </a:p>
           </p:txBody>
         </p:sp>
@@ -6198,14 +6158,13 @@
             <a:lstStyle/>
             <a:p>
               <a:r>
-                <a:rPr lang="en-US" dirty="0" smtClean="0"/>
+                <a:rPr lang="en-US" dirty="0"/>
                 <a:t>Floating blade reference frame at instant </a:t>
               </a:r>
               <a:r>
-                <a:rPr lang="en-US" i="1" dirty="0" smtClean="0"/>
+                <a:rPr lang="en-US" i="1" dirty="0"/>
                 <a:t>t</a:t>
               </a:r>
-              <a:endParaRPr lang="en-US" i="1" dirty="0"/>
             </a:p>
           </p:txBody>
         </p:sp>
@@ -6258,13 +6217,6 @@
   <p:clrMapOvr>
     <a:masterClrMapping/>
   </p:clrMapOvr>
-  <p:timing>
-    <p:tnLst>
-      <p:par>
-        <p:cTn xmlns:p14="http://schemas.microsoft.com/office/powerpoint/2010/main" id="1" dur="indefinite" restart="never" nodeType="tmRoot"/>
-      </p:par>
-    </p:tnLst>
-  </p:timing>
 </p:sld>
 </file>
 
@@ -6443,16 +6395,12 @@
           <a:lstStyle/>
           <a:p>
             <a:r>
-              <a:rPr lang="en-US" b="1" i="1" dirty="0" smtClean="0">
+              <a:rPr lang="en-US" b="1" i="1" dirty="0">
                 <a:latin typeface="Times New Roman"/>
                 <a:cs typeface="Times New Roman"/>
               </a:rPr>
               <a:t>X</a:t>
             </a:r>
-            <a:endParaRPr lang="en-US" b="1" i="1" dirty="0">
-              <a:latin typeface="Times New Roman"/>
-              <a:cs typeface="Times New Roman"/>
-            </a:endParaRPr>
           </a:p>
         </p:txBody>
       </p:sp>
@@ -6479,16 +6427,12 @@
           <a:lstStyle/>
           <a:p>
             <a:r>
-              <a:rPr lang="en-US" b="1" i="1" dirty="0" smtClean="0">
+              <a:rPr lang="en-US" b="1" i="1" dirty="0">
                 <a:latin typeface="Times New Roman"/>
                 <a:cs typeface="Times New Roman"/>
               </a:rPr>
               <a:t>Z</a:t>
             </a:r>
-            <a:endParaRPr lang="en-US" b="1" i="1" dirty="0">
-              <a:latin typeface="Times New Roman"/>
-              <a:cs typeface="Times New Roman"/>
-            </a:endParaRPr>
           </a:p>
         </p:txBody>
       </p:sp>
@@ -6737,16 +6681,12 @@
               <a:lstStyle/>
               <a:p>
                 <a:r>
-                  <a:rPr lang="en-US" b="1" i="1" dirty="0" smtClean="0">
+                  <a:rPr lang="en-US" b="1" i="1" dirty="0">
                     <a:latin typeface="Times New Roman"/>
                     <a:cs typeface="Times New Roman"/>
                   </a:rPr>
                   <a:t>Z</a:t>
                 </a:r>
-                <a:endParaRPr lang="en-US" b="1" i="1" dirty="0">
-                  <a:latin typeface="Times New Roman"/>
-                  <a:cs typeface="Times New Roman"/>
-                </a:endParaRPr>
               </a:p>
             </p:txBody>
           </p:sp>
@@ -6853,35 +6793,35 @@
                 <a:lstStyle/>
                 <a:p>
                   <a:r>
-                    <a:rPr lang="en-US" b="1" i="1" dirty="0" smtClean="0">
+                    <a:rPr lang="en-US" b="1" i="1" dirty="0">
                       <a:latin typeface="Times New Roman"/>
                       <a:cs typeface="Times New Roman"/>
                     </a:rPr>
                     <a:t>Z</a:t>
                   </a:r>
                   <a:r>
-                    <a:rPr lang="en-US" b="1" i="1" baseline="-25000" dirty="0" smtClean="0">
+                    <a:rPr lang="en-US" b="1" i="1" baseline="-25000" dirty="0">
                       <a:latin typeface="Times New Roman"/>
                       <a:cs typeface="Times New Roman"/>
                     </a:rPr>
                     <a:t>r0 </a:t>
                   </a:r>
                   <a:r>
-                    <a:rPr lang="en-US" i="1" dirty="0" smtClean="0">
+                    <a:rPr lang="en-US" i="1" dirty="0">
                       <a:latin typeface="Times New Roman"/>
                       <a:cs typeface="Times New Roman"/>
                     </a:rPr>
                     <a:t>(x</a:t>
                   </a:r>
                   <a:r>
-                    <a:rPr lang="en-US" i="1" baseline="-25000" dirty="0" smtClean="0">
+                    <a:rPr lang="en-US" i="1" baseline="-25000" dirty="0">
                       <a:latin typeface="Times New Roman"/>
                       <a:cs typeface="Times New Roman"/>
                     </a:rPr>
-                    <a:t>1</a:t>
+                    <a:t>3</a:t>
                   </a:r>
                   <a:r>
-                    <a:rPr lang="en-US" i="1" dirty="0" smtClean="0">
+                    <a:rPr lang="en-US" i="1" dirty="0">
                       <a:latin typeface="Times New Roman"/>
                       <a:cs typeface="Times New Roman"/>
                     </a:rPr>
@@ -6924,28 +6864,28 @@
                     <a:t>Y</a:t>
                   </a:r>
                   <a:r>
-                    <a:rPr lang="en-US" b="1" i="1" baseline="-25000" dirty="0" smtClean="0">
+                    <a:rPr lang="en-US" b="1" i="1" baseline="-25000" dirty="0">
                       <a:latin typeface="Times New Roman"/>
                       <a:cs typeface="Times New Roman"/>
                     </a:rPr>
                     <a:t>r0 </a:t>
                   </a:r>
                   <a:r>
-                    <a:rPr lang="en-US" i="1" dirty="0" smtClean="0">
+                    <a:rPr lang="en-US" i="1" dirty="0">
                       <a:latin typeface="Times New Roman"/>
                       <a:cs typeface="Times New Roman"/>
                     </a:rPr>
                     <a:t>(x</a:t>
                   </a:r>
                   <a:r>
-                    <a:rPr lang="en-US" i="1" baseline="-25000" dirty="0" smtClean="0">
+                    <a:rPr lang="en-US" i="1" baseline="-25000" dirty="0">
                       <a:latin typeface="Times New Roman"/>
                       <a:cs typeface="Times New Roman"/>
                     </a:rPr>
-                    <a:t>3</a:t>
+                    <a:t>2</a:t>
                   </a:r>
                   <a:r>
-                    <a:rPr lang="en-US" i="1" dirty="0" smtClean="0">
+                    <a:rPr lang="en-US" i="1" dirty="0">
                       <a:latin typeface="Times New Roman"/>
                       <a:cs typeface="Times New Roman"/>
                     </a:rPr>
@@ -6995,10 +6935,9 @@
             <a:p>
               <a:pPr algn="ctr"/>
               <a:r>
-                <a:rPr lang="en-US" dirty="0" smtClean="0"/>
+                <a:rPr lang="en-US" dirty="0"/>
                 <a:t>1</a:t>
               </a:r>
-              <a:endParaRPr lang="en-US" dirty="0"/>
             </a:p>
           </p:txBody>
         </p:sp>

</xml_diff>